<commit_message>
add R logo :D
git-svn-id: https://www.ke.informatik.tu-darmstadt.de/svn/DMC14/R/trunk@1637 3bb05a21-cac8-4fc5-993d-a39f5ef0ea84
</commit_message>
<xml_diff>
--- a/doc/pres-prudsys.pptx
+++ b/doc/pres-prudsys.pptx
@@ -6676,6 +6676,106 @@
             <a:r>
               <a:rPr lang="de-DE" dirty="0" smtClean="0"/>
               <a:t>Data Mining Cup 2014</a:t>
+            </a:r>
+            <a:endParaRPr lang="en-US" dirty="0"/>
+          </a:p>
+        </p:txBody>
+      </p:sp>
+      <p:pic>
+        <p:nvPicPr>
+          <p:cNvPr id="4" name="Picture 3"/>
+          <p:cNvPicPr>
+            <a:picLocks noChangeAspect="1"/>
+          </p:cNvPicPr>
+          <p:nvPr/>
+        </p:nvPicPr>
+        <p:blipFill>
+          <a:blip r:embed="rId3" cstate="print">
+            <a:extLst>
+              <a:ext uri="{28A0092B-C50C-407E-A947-70E740481C1C}">
+                <a14:useLocalDpi xmlns:a14="http://schemas.microsoft.com/office/drawing/2010/main" val="0"/>
+              </a:ext>
+            </a:extLst>
+          </a:blip>
+          <a:stretch>
+            <a:fillRect/>
+          </a:stretch>
+        </p:blipFill>
+        <p:spPr>
+          <a:xfrm>
+            <a:off x="6395428" y="2286793"/>
+            <a:ext cx="2229890" cy="1691641"/>
+          </a:xfrm>
+          <a:prstGeom prst="rect">
+            <a:avLst/>
+          </a:prstGeom>
+        </p:spPr>
+      </p:pic>
+      <p:sp>
+        <p:nvSpPr>
+          <p:cNvPr id="5" name="TextBox 4"/>
+          <p:cNvSpPr txBox="1"/>
+          <p:nvPr/>
+        </p:nvSpPr>
+        <p:spPr>
+          <a:xfrm>
+            <a:off x="539552" y="2393950"/>
+            <a:ext cx="3168352" cy="1477328"/>
+          </a:xfrm>
+          <a:prstGeom prst="rect">
+            <a:avLst/>
+          </a:prstGeom>
+          <a:noFill/>
+        </p:spPr>
+        <p:txBody>
+          <a:bodyPr wrap="square" rtlCol="0">
+            <a:spAutoFit/>
+          </a:bodyPr>
+          <a:lstStyle/>
+          <a:p>
+            <a:r>
+              <a:rPr lang="de-DE" dirty="0" smtClean="0"/>
+              <a:t>Group R:</a:t>
+            </a:r>
+          </a:p>
+          <a:p>
+            <a:pPr marL="285750" indent="-285750">
+              <a:buFont typeface="Arial" pitchFamily="34" charset="0"/>
+              <a:buChar char="•"/>
+            </a:pPr>
+            <a:r>
+              <a:rPr lang="de-DE" dirty="0" smtClean="0"/>
+              <a:t>Fabian Hirschmann</a:t>
+            </a:r>
+          </a:p>
+          <a:p>
+            <a:pPr marL="285750" indent="-285750">
+              <a:buFont typeface="Arial" pitchFamily="34" charset="0"/>
+              <a:buChar char="•"/>
+            </a:pPr>
+            <a:r>
+              <a:rPr lang="de-DE" dirty="0" smtClean="0"/>
+              <a:t>Simon Holthausen</a:t>
+            </a:r>
+          </a:p>
+          <a:p>
+            <a:pPr marL="285750" indent="-285750">
+              <a:buFont typeface="Arial" pitchFamily="34" charset="0"/>
+              <a:buChar char="•"/>
+            </a:pPr>
+            <a:r>
+              <a:rPr lang="de-DE" dirty="0" smtClean="0"/>
+              <a:t>Michael Markert</a:t>
+            </a:r>
+          </a:p>
+          <a:p>
+            <a:pPr marL="285750" indent="-285750">
+              <a:buFont typeface="Arial" pitchFamily="34" charset="0"/>
+              <a:buChar char="•"/>
+            </a:pPr>
+            <a:r>
+              <a:rPr lang="de-DE" dirty="0" smtClean="0"/>
+              <a:t>Christoph Schatton</a:t>
             </a:r>
             <a:endParaRPr lang="en-US" dirty="0"/>
           </a:p>

</xml_diff>